<commit_message>
add stair theory contents
</commit_message>
<xml_diff>
--- a/figure.pptx
+++ b/figure.pptx
@@ -9,6 +9,7 @@
     <p:sldId id="257" r:id="rId3"/>
     <p:sldId id="258" r:id="rId4"/>
     <p:sldId id="259" r:id="rId5"/>
+    <p:sldId id="260" r:id="rId6"/>
   </p:sldIdLst>
   <p:sldSz cx="12192000" cy="6858000"/>
   <p:notesSz cx="6858000" cy="9144000"/>
@@ -262,7 +263,7 @@
           <a:p>
             <a:fld id="{50DB86B2-1F85-458D-BB4D-F9A4D62C4F3A}" type="datetimeFigureOut">
               <a:rPr kumimoji="1" lang="ja-JP" altLang="en-US" smtClean="0"/>
-              <a:t>2024/11/17</a:t>
+              <a:t>2024/11/27</a:t>
             </a:fld>
             <a:endParaRPr kumimoji="1" lang="ja-JP" altLang="en-US"/>
           </a:p>
@@ -492,7 +493,7 @@
           <a:p>
             <a:fld id="{50DB86B2-1F85-458D-BB4D-F9A4D62C4F3A}" type="datetimeFigureOut">
               <a:rPr kumimoji="1" lang="ja-JP" altLang="en-US" smtClean="0"/>
-              <a:t>2024/11/17</a:t>
+              <a:t>2024/11/27</a:t>
             </a:fld>
             <a:endParaRPr kumimoji="1" lang="ja-JP" altLang="en-US"/>
           </a:p>
@@ -732,7 +733,7 @@
           <a:p>
             <a:fld id="{50DB86B2-1F85-458D-BB4D-F9A4D62C4F3A}" type="datetimeFigureOut">
               <a:rPr kumimoji="1" lang="ja-JP" altLang="en-US" smtClean="0"/>
-              <a:t>2024/11/17</a:t>
+              <a:t>2024/11/27</a:t>
             </a:fld>
             <a:endParaRPr kumimoji="1" lang="ja-JP" altLang="en-US"/>
           </a:p>
@@ -962,7 +963,7 @@
           <a:p>
             <a:fld id="{50DB86B2-1F85-458D-BB4D-F9A4D62C4F3A}" type="datetimeFigureOut">
               <a:rPr kumimoji="1" lang="ja-JP" altLang="en-US" smtClean="0"/>
-              <a:t>2024/11/17</a:t>
+              <a:t>2024/11/27</a:t>
             </a:fld>
             <a:endParaRPr kumimoji="1" lang="ja-JP" altLang="en-US"/>
           </a:p>
@@ -1237,7 +1238,7 @@
           <a:p>
             <a:fld id="{50DB86B2-1F85-458D-BB4D-F9A4D62C4F3A}" type="datetimeFigureOut">
               <a:rPr kumimoji="1" lang="ja-JP" altLang="en-US" smtClean="0"/>
-              <a:t>2024/11/17</a:t>
+              <a:t>2024/11/27</a:t>
             </a:fld>
             <a:endParaRPr kumimoji="1" lang="ja-JP" altLang="en-US"/>
           </a:p>
@@ -1566,7 +1567,7 @@
           <a:p>
             <a:fld id="{50DB86B2-1F85-458D-BB4D-F9A4D62C4F3A}" type="datetimeFigureOut">
               <a:rPr kumimoji="1" lang="ja-JP" altLang="en-US" smtClean="0"/>
-              <a:t>2024/11/17</a:t>
+              <a:t>2024/11/27</a:t>
             </a:fld>
             <a:endParaRPr kumimoji="1" lang="ja-JP" altLang="en-US"/>
           </a:p>
@@ -2042,7 +2043,7 @@
           <a:p>
             <a:fld id="{50DB86B2-1F85-458D-BB4D-F9A4D62C4F3A}" type="datetimeFigureOut">
               <a:rPr kumimoji="1" lang="ja-JP" altLang="en-US" smtClean="0"/>
-              <a:t>2024/11/17</a:t>
+              <a:t>2024/11/27</a:t>
             </a:fld>
             <a:endParaRPr kumimoji="1" lang="ja-JP" altLang="en-US"/>
           </a:p>
@@ -2183,7 +2184,7 @@
           <a:p>
             <a:fld id="{50DB86B2-1F85-458D-BB4D-F9A4D62C4F3A}" type="datetimeFigureOut">
               <a:rPr kumimoji="1" lang="ja-JP" altLang="en-US" smtClean="0"/>
-              <a:t>2024/11/17</a:t>
+              <a:t>2024/11/27</a:t>
             </a:fld>
             <a:endParaRPr kumimoji="1" lang="ja-JP" altLang="en-US"/>
           </a:p>
@@ -2296,7 +2297,7 @@
           <a:p>
             <a:fld id="{50DB86B2-1F85-458D-BB4D-F9A4D62C4F3A}" type="datetimeFigureOut">
               <a:rPr kumimoji="1" lang="ja-JP" altLang="en-US" smtClean="0"/>
-              <a:t>2024/11/17</a:t>
+              <a:t>2024/11/27</a:t>
             </a:fld>
             <a:endParaRPr kumimoji="1" lang="ja-JP" altLang="en-US"/>
           </a:p>
@@ -2639,7 +2640,7 @@
           <a:p>
             <a:fld id="{50DB86B2-1F85-458D-BB4D-F9A4D62C4F3A}" type="datetimeFigureOut">
               <a:rPr kumimoji="1" lang="ja-JP" altLang="en-US" smtClean="0"/>
-              <a:t>2024/11/17</a:t>
+              <a:t>2024/11/27</a:t>
             </a:fld>
             <a:endParaRPr kumimoji="1" lang="ja-JP" altLang="en-US"/>
           </a:p>
@@ -2927,7 +2928,7 @@
           <a:p>
             <a:fld id="{50DB86B2-1F85-458D-BB4D-F9A4D62C4F3A}" type="datetimeFigureOut">
               <a:rPr kumimoji="1" lang="ja-JP" altLang="en-US" smtClean="0"/>
-              <a:t>2024/11/17</a:t>
+              <a:t>2024/11/27</a:t>
             </a:fld>
             <a:endParaRPr kumimoji="1" lang="ja-JP" altLang="en-US"/>
           </a:p>
@@ -3200,7 +3201,7 @@
           <a:p>
             <a:fld id="{50DB86B2-1F85-458D-BB4D-F9A4D62C4F3A}" type="datetimeFigureOut">
               <a:rPr kumimoji="1" lang="ja-JP" altLang="en-US" smtClean="0"/>
-              <a:t>2024/11/17</a:t>
+              <a:t>2024/11/27</a:t>
             </a:fld>
             <a:endParaRPr kumimoji="1" lang="ja-JP" altLang="en-US"/>
           </a:p>
@@ -9279,6 +9280,834 @@
 </p:sld>
 </file>
 
+<file path=ppt/slides/slide5.xml><?xml version="1.0" encoding="utf-8"?>
+<p:sld xmlns:a="http://schemas.openxmlformats.org/drawingml/2006/main" xmlns:r="http://schemas.openxmlformats.org/officeDocument/2006/relationships" xmlns:p="http://schemas.openxmlformats.org/presentationml/2006/main">
+  <p:cSld>
+    <p:spTree>
+      <p:nvGrpSpPr>
+        <p:cNvPr id="1" name=""/>
+        <p:cNvGrpSpPr/>
+        <p:nvPr/>
+      </p:nvGrpSpPr>
+      <p:grpSpPr>
+        <a:xfrm>
+          <a:off x="0" y="0"/>
+          <a:ext cx="0" cy="0"/>
+          <a:chOff x="0" y="0"/>
+          <a:chExt cx="0" cy="0"/>
+        </a:xfrm>
+      </p:grpSpPr>
+      <p:pic>
+        <p:nvPicPr>
+          <p:cNvPr id="16" name="図 15">
+            <a:extLst>
+              <a:ext uri="{FF2B5EF4-FFF2-40B4-BE49-F238E27FC236}">
+                <a16:creationId xmlns:a16="http://schemas.microsoft.com/office/drawing/2014/main" id="{A79682DE-E721-F5CE-7D89-891F225A3136}"/>
+              </a:ext>
+            </a:extLst>
+          </p:cNvPr>
+          <p:cNvPicPr>
+            <a:picLocks noChangeAspect="1"/>
+          </p:cNvPicPr>
+          <p:nvPr/>
+        </p:nvPicPr>
+        <p:blipFill>
+          <a:blip r:embed="rId2"/>
+          <a:srcRect r="70488"/>
+          <a:stretch/>
+        </p:blipFill>
+        <p:spPr>
+          <a:xfrm>
+            <a:off x="630557" y="517381"/>
+            <a:ext cx="1810493" cy="2682472"/>
+          </a:xfrm>
+          <a:prstGeom prst="rect">
+            <a:avLst/>
+          </a:prstGeom>
+        </p:spPr>
+      </p:pic>
+      <p:sp>
+        <p:nvSpPr>
+          <p:cNvPr id="35" name="正方形/長方形 34">
+            <a:extLst>
+              <a:ext uri="{FF2B5EF4-FFF2-40B4-BE49-F238E27FC236}">
+                <a16:creationId xmlns:a16="http://schemas.microsoft.com/office/drawing/2014/main" id="{5FC19625-7B4C-DF97-CBC0-7F448DA86957}"/>
+              </a:ext>
+            </a:extLst>
+          </p:cNvPr>
+          <p:cNvSpPr/>
+          <p:nvPr/>
+        </p:nvSpPr>
+        <p:spPr>
+          <a:xfrm>
+            <a:off x="2099881" y="2173847"/>
+            <a:ext cx="984672" cy="705821"/>
+          </a:xfrm>
+          <a:prstGeom prst="rect">
+            <a:avLst/>
+          </a:prstGeom>
+          <a:solidFill>
+            <a:schemeClr val="bg1">
+              <a:lumMod val="75000"/>
+            </a:schemeClr>
+          </a:solidFill>
+          <a:ln>
+            <a:noFill/>
+          </a:ln>
+        </p:spPr>
+        <p:style>
+          <a:lnRef idx="2">
+            <a:schemeClr val="accent1">
+              <a:shade val="15000"/>
+            </a:schemeClr>
+          </a:lnRef>
+          <a:fillRef idx="1">
+            <a:schemeClr val="accent1"/>
+          </a:fillRef>
+          <a:effectRef idx="0">
+            <a:schemeClr val="accent1"/>
+          </a:effectRef>
+          <a:fontRef idx="minor">
+            <a:schemeClr val="lt1"/>
+          </a:fontRef>
+        </p:style>
+        <p:txBody>
+          <a:bodyPr rtlCol="0" anchor="ctr"/>
+          <a:lstStyle/>
+          <a:p>
+            <a:pPr algn="ctr"/>
+            <a:endParaRPr kumimoji="1" lang="ja-JP" altLang="en-US" dirty="0"/>
+          </a:p>
+        </p:txBody>
+      </p:sp>
+      <p:sp>
+        <p:nvSpPr>
+          <p:cNvPr id="17" name="正方形/長方形 16">
+            <a:extLst>
+              <a:ext uri="{FF2B5EF4-FFF2-40B4-BE49-F238E27FC236}">
+                <a16:creationId xmlns:a16="http://schemas.microsoft.com/office/drawing/2014/main" id="{B84285F3-1C5E-BCA5-775F-C05172D996F8}"/>
+              </a:ext>
+            </a:extLst>
+          </p:cNvPr>
+          <p:cNvSpPr/>
+          <p:nvPr/>
+        </p:nvSpPr>
+        <p:spPr>
+          <a:xfrm>
+            <a:off x="752079" y="2875789"/>
+            <a:ext cx="2332474" cy="229343"/>
+          </a:xfrm>
+          <a:prstGeom prst="rect">
+            <a:avLst/>
+          </a:prstGeom>
+          <a:solidFill>
+            <a:schemeClr val="bg1">
+              <a:lumMod val="75000"/>
+            </a:schemeClr>
+          </a:solidFill>
+          <a:ln>
+            <a:noFill/>
+          </a:ln>
+        </p:spPr>
+        <p:style>
+          <a:lnRef idx="2">
+            <a:schemeClr val="accent1">
+              <a:shade val="15000"/>
+            </a:schemeClr>
+          </a:lnRef>
+          <a:fillRef idx="1">
+            <a:schemeClr val="accent1"/>
+          </a:fillRef>
+          <a:effectRef idx="0">
+            <a:schemeClr val="accent1"/>
+          </a:effectRef>
+          <a:fontRef idx="minor">
+            <a:schemeClr val="lt1"/>
+          </a:fontRef>
+        </p:style>
+        <p:txBody>
+          <a:bodyPr rtlCol="0" anchor="ctr"/>
+          <a:lstStyle/>
+          <a:p>
+            <a:pPr algn="ctr"/>
+            <a:endParaRPr kumimoji="1" lang="ja-JP" altLang="en-US"/>
+          </a:p>
+        </p:txBody>
+      </p:sp>
+      <p:sp>
+        <p:nvSpPr>
+          <p:cNvPr id="25" name="四角形: 角を丸くする 24">
+            <a:extLst>
+              <a:ext uri="{FF2B5EF4-FFF2-40B4-BE49-F238E27FC236}">
+                <a16:creationId xmlns:a16="http://schemas.microsoft.com/office/drawing/2014/main" id="{7FF3F82A-A419-3EAE-B891-B0AF4E3EC1A8}"/>
+              </a:ext>
+            </a:extLst>
+          </p:cNvPr>
+          <p:cNvSpPr/>
+          <p:nvPr/>
+        </p:nvSpPr>
+        <p:spPr>
+          <a:xfrm>
+            <a:off x="1573542" y="2060158"/>
+            <a:ext cx="513366" cy="292562"/>
+          </a:xfrm>
+          <a:prstGeom prst="roundRect">
+            <a:avLst/>
+          </a:prstGeom>
+          <a:solidFill>
+            <a:schemeClr val="bg1">
+              <a:lumMod val="75000"/>
+              <a:alpha val="70000"/>
+            </a:schemeClr>
+          </a:solidFill>
+          <a:ln>
+            <a:solidFill>
+              <a:schemeClr val="tx1"/>
+            </a:solidFill>
+          </a:ln>
+        </p:spPr>
+        <p:style>
+          <a:lnRef idx="2">
+            <a:schemeClr val="accent1">
+              <a:shade val="15000"/>
+            </a:schemeClr>
+          </a:lnRef>
+          <a:fillRef idx="1">
+            <a:schemeClr val="accent1"/>
+          </a:fillRef>
+          <a:effectRef idx="0">
+            <a:schemeClr val="accent1"/>
+          </a:effectRef>
+          <a:fontRef idx="minor">
+            <a:schemeClr val="lt1"/>
+          </a:fontRef>
+        </p:style>
+        <p:txBody>
+          <a:bodyPr rtlCol="0" anchor="ctr"/>
+          <a:lstStyle/>
+          <a:p>
+            <a:pPr algn="ctr"/>
+            <a:endParaRPr kumimoji="1" lang="ja-JP" altLang="en-US"/>
+          </a:p>
+        </p:txBody>
+      </p:sp>
+      <p:sp>
+        <p:nvSpPr>
+          <p:cNvPr id="21" name="テキスト ボックス 20">
+            <a:extLst>
+              <a:ext uri="{FF2B5EF4-FFF2-40B4-BE49-F238E27FC236}">
+                <a16:creationId xmlns:a16="http://schemas.microsoft.com/office/drawing/2014/main" id="{60EEE717-167D-E1E5-6148-33AD2F3A329C}"/>
+              </a:ext>
+            </a:extLst>
+          </p:cNvPr>
+          <p:cNvSpPr txBox="1"/>
+          <p:nvPr/>
+        </p:nvSpPr>
+        <p:spPr>
+          <a:xfrm>
+            <a:off x="1878308" y="3308947"/>
+            <a:ext cx="1810493" cy="369332"/>
+          </a:xfrm>
+          <a:prstGeom prst="rect">
+            <a:avLst/>
+          </a:prstGeom>
+          <a:noFill/>
+        </p:spPr>
+        <p:txBody>
+          <a:bodyPr wrap="square" rtlCol="0">
+            <a:spAutoFit/>
+          </a:bodyPr>
+          <a:lstStyle/>
+          <a:p>
+            <a:r>
+              <a:rPr lang="ja-JP" altLang="en-US" b="1" dirty="0">
+                <a:ea typeface="Meiryo UI" panose="020B0604030504040204" pitchFamily="50" charset="-128"/>
+              </a:rPr>
+              <a:t>実際の遊脚軌道</a:t>
+            </a:r>
+            <a:endParaRPr kumimoji="1" lang="ja-JP" altLang="en-US" b="1" dirty="0">
+              <a:ea typeface="Meiryo UI" panose="020B0604030504040204" pitchFamily="50" charset="-128"/>
+            </a:endParaRPr>
+          </a:p>
+        </p:txBody>
+      </p:sp>
+      <p:cxnSp>
+        <p:nvCxnSpPr>
+          <p:cNvPr id="22" name="直線コネクタ 21">
+            <a:extLst>
+              <a:ext uri="{FF2B5EF4-FFF2-40B4-BE49-F238E27FC236}">
+                <a16:creationId xmlns:a16="http://schemas.microsoft.com/office/drawing/2014/main" id="{6442A853-73DA-38BE-0974-E4BC343DD999}"/>
+              </a:ext>
+            </a:extLst>
+          </p:cNvPr>
+          <p:cNvCxnSpPr>
+            <a:cxnSpLocks/>
+            <a:stCxn id="21" idx="1"/>
+          </p:cNvCxnSpPr>
+          <p:nvPr/>
+        </p:nvCxnSpPr>
+        <p:spPr>
+          <a:xfrm flipH="1" flipV="1">
+            <a:off x="1727607" y="2405508"/>
+            <a:ext cx="150701" cy="1088105"/>
+          </a:xfrm>
+          <a:prstGeom prst="line">
+            <a:avLst/>
+          </a:prstGeom>
+        </p:spPr>
+        <p:style>
+          <a:lnRef idx="2">
+            <a:schemeClr val="dk1"/>
+          </a:lnRef>
+          <a:fillRef idx="0">
+            <a:schemeClr val="dk1"/>
+          </a:fillRef>
+          <a:effectRef idx="1">
+            <a:schemeClr val="dk1"/>
+          </a:effectRef>
+          <a:fontRef idx="minor">
+            <a:schemeClr val="tx1"/>
+          </a:fontRef>
+        </p:style>
+      </p:cxnSp>
+      <p:sp>
+        <p:nvSpPr>
+          <p:cNvPr id="24" name="四角形: 角を丸くする 23">
+            <a:extLst>
+              <a:ext uri="{FF2B5EF4-FFF2-40B4-BE49-F238E27FC236}">
+                <a16:creationId xmlns:a16="http://schemas.microsoft.com/office/drawing/2014/main" id="{46CBE573-A7A8-75F6-7CCA-1E5B34392CB7}"/>
+              </a:ext>
+            </a:extLst>
+          </p:cNvPr>
+          <p:cNvSpPr/>
+          <p:nvPr/>
+        </p:nvSpPr>
+        <p:spPr>
+          <a:xfrm>
+            <a:off x="1003392" y="2575082"/>
+            <a:ext cx="513366" cy="292562"/>
+          </a:xfrm>
+          <a:prstGeom prst="roundRect">
+            <a:avLst/>
+          </a:prstGeom>
+          <a:solidFill>
+            <a:schemeClr val="bg1">
+              <a:lumMod val="75000"/>
+              <a:alpha val="70000"/>
+            </a:schemeClr>
+          </a:solidFill>
+          <a:ln>
+            <a:solidFill>
+              <a:schemeClr val="tx1"/>
+            </a:solidFill>
+          </a:ln>
+        </p:spPr>
+        <p:style>
+          <a:lnRef idx="2">
+            <a:schemeClr val="accent1">
+              <a:shade val="15000"/>
+            </a:schemeClr>
+          </a:lnRef>
+          <a:fillRef idx="1">
+            <a:schemeClr val="accent1"/>
+          </a:fillRef>
+          <a:effectRef idx="0">
+            <a:schemeClr val="accent1"/>
+          </a:effectRef>
+          <a:fontRef idx="minor">
+            <a:schemeClr val="lt1"/>
+          </a:fontRef>
+        </p:style>
+        <p:txBody>
+          <a:bodyPr rtlCol="0" anchor="ctr"/>
+          <a:lstStyle/>
+          <a:p>
+            <a:pPr algn="ctr"/>
+            <a:endParaRPr kumimoji="1" lang="ja-JP" altLang="en-US"/>
+          </a:p>
+        </p:txBody>
+      </p:sp>
+      <p:sp>
+        <p:nvSpPr>
+          <p:cNvPr id="26" name="テキスト ボックス 25">
+            <a:extLst>
+              <a:ext uri="{FF2B5EF4-FFF2-40B4-BE49-F238E27FC236}">
+                <a16:creationId xmlns:a16="http://schemas.microsoft.com/office/drawing/2014/main" id="{636FA066-92D9-4B14-BD61-81CBA8031A85}"/>
+              </a:ext>
+            </a:extLst>
+          </p:cNvPr>
+          <p:cNvSpPr txBox="1"/>
+          <p:nvPr/>
+        </p:nvSpPr>
+        <p:spPr>
+          <a:xfrm>
+            <a:off x="1685195" y="3731376"/>
+            <a:ext cx="803425" cy="369332"/>
+          </a:xfrm>
+          <a:prstGeom prst="rect">
+            <a:avLst/>
+          </a:prstGeom>
+          <a:noFill/>
+        </p:spPr>
+        <p:txBody>
+          <a:bodyPr wrap="none" rtlCol="0">
+            <a:spAutoFit/>
+          </a:bodyPr>
+          <a:lstStyle/>
+          <a:p>
+            <a:r>
+              <a:rPr kumimoji="1" lang="ja-JP" altLang="en-US" b="1" dirty="0">
+                <a:ea typeface="Meiryo UI" panose="020B0604030504040204" pitchFamily="50" charset="-128"/>
+              </a:rPr>
+              <a:t>振り足</a:t>
+            </a:r>
+          </a:p>
+        </p:txBody>
+      </p:sp>
+      <p:cxnSp>
+        <p:nvCxnSpPr>
+          <p:cNvPr id="27" name="直線コネクタ 26">
+            <a:extLst>
+              <a:ext uri="{FF2B5EF4-FFF2-40B4-BE49-F238E27FC236}">
+                <a16:creationId xmlns:a16="http://schemas.microsoft.com/office/drawing/2014/main" id="{CD3A18C2-36DB-479E-AD12-CDCBA290A523}"/>
+              </a:ext>
+            </a:extLst>
+          </p:cNvPr>
+          <p:cNvCxnSpPr>
+            <a:cxnSpLocks/>
+            <a:endCxn id="26" idx="1"/>
+          </p:cNvCxnSpPr>
+          <p:nvPr/>
+        </p:nvCxnSpPr>
+        <p:spPr>
+          <a:xfrm>
+            <a:off x="1359317" y="2713175"/>
+            <a:ext cx="325878" cy="1202867"/>
+          </a:xfrm>
+          <a:prstGeom prst="line">
+            <a:avLst/>
+          </a:prstGeom>
+        </p:spPr>
+        <p:style>
+          <a:lnRef idx="2">
+            <a:schemeClr val="dk1"/>
+          </a:lnRef>
+          <a:fillRef idx="0">
+            <a:schemeClr val="dk1"/>
+          </a:fillRef>
+          <a:effectRef idx="1">
+            <a:schemeClr val="dk1"/>
+          </a:effectRef>
+          <a:fontRef idx="minor">
+            <a:schemeClr val="tx1"/>
+          </a:fontRef>
+        </p:style>
+      </p:cxnSp>
+      <p:sp>
+        <p:nvSpPr>
+          <p:cNvPr id="29" name="楕円 28">
+            <a:extLst>
+              <a:ext uri="{FF2B5EF4-FFF2-40B4-BE49-F238E27FC236}">
+                <a16:creationId xmlns:a16="http://schemas.microsoft.com/office/drawing/2014/main" id="{66BE1AD3-1969-942C-600A-60FC567DB1F2}"/>
+              </a:ext>
+            </a:extLst>
+          </p:cNvPr>
+          <p:cNvSpPr/>
+          <p:nvPr/>
+        </p:nvSpPr>
+        <p:spPr>
+          <a:xfrm>
+            <a:off x="1200893" y="2832018"/>
+            <a:ext cx="72000" cy="72000"/>
+          </a:xfrm>
+          <a:prstGeom prst="ellipse">
+            <a:avLst/>
+          </a:prstGeom>
+        </p:spPr>
+        <p:style>
+          <a:lnRef idx="2">
+            <a:schemeClr val="dk1">
+              <a:shade val="15000"/>
+            </a:schemeClr>
+          </a:lnRef>
+          <a:fillRef idx="1">
+            <a:schemeClr val="dk1"/>
+          </a:fillRef>
+          <a:effectRef idx="0">
+            <a:schemeClr val="dk1"/>
+          </a:effectRef>
+          <a:fontRef idx="minor">
+            <a:schemeClr val="lt1"/>
+          </a:fontRef>
+        </p:style>
+        <p:txBody>
+          <a:bodyPr rtlCol="0" anchor="ctr"/>
+          <a:lstStyle/>
+          <a:p>
+            <a:pPr algn="ctr"/>
+            <a:endParaRPr kumimoji="1" lang="ja-JP" altLang="en-US"/>
+          </a:p>
+        </p:txBody>
+      </p:sp>
+      <p:sp>
+        <p:nvSpPr>
+          <p:cNvPr id="30" name="楕円 29">
+            <a:extLst>
+              <a:ext uri="{FF2B5EF4-FFF2-40B4-BE49-F238E27FC236}">
+                <a16:creationId xmlns:a16="http://schemas.microsoft.com/office/drawing/2014/main" id="{72572AE9-49B1-70F5-9022-70B04F2F7B7C}"/>
+              </a:ext>
+            </a:extLst>
+          </p:cNvPr>
+          <p:cNvSpPr/>
+          <p:nvPr/>
+        </p:nvSpPr>
+        <p:spPr>
+          <a:xfrm>
+            <a:off x="1806308" y="2325363"/>
+            <a:ext cx="72000" cy="72000"/>
+          </a:xfrm>
+          <a:prstGeom prst="ellipse">
+            <a:avLst/>
+          </a:prstGeom>
+        </p:spPr>
+        <p:style>
+          <a:lnRef idx="2">
+            <a:schemeClr val="dk1">
+              <a:shade val="15000"/>
+            </a:schemeClr>
+          </a:lnRef>
+          <a:fillRef idx="1">
+            <a:schemeClr val="dk1"/>
+          </a:fillRef>
+          <a:effectRef idx="0">
+            <a:schemeClr val="dk1"/>
+          </a:effectRef>
+          <a:fontRef idx="minor">
+            <a:schemeClr val="lt1"/>
+          </a:fontRef>
+        </p:style>
+        <p:txBody>
+          <a:bodyPr rtlCol="0" anchor="ctr"/>
+          <a:lstStyle/>
+          <a:p>
+            <a:pPr algn="ctr"/>
+            <a:endParaRPr kumimoji="1" lang="ja-JP" altLang="en-US"/>
+          </a:p>
+        </p:txBody>
+      </p:sp>
+      <p:cxnSp>
+        <p:nvCxnSpPr>
+          <p:cNvPr id="37" name="直線コネクタ 36">
+            <a:extLst>
+              <a:ext uri="{FF2B5EF4-FFF2-40B4-BE49-F238E27FC236}">
+                <a16:creationId xmlns:a16="http://schemas.microsoft.com/office/drawing/2014/main" id="{BA8E4F64-1295-1C60-D1C7-FA1B95900F8F}"/>
+              </a:ext>
+            </a:extLst>
+          </p:cNvPr>
+          <p:cNvCxnSpPr>
+            <a:cxnSpLocks/>
+          </p:cNvCxnSpPr>
+          <p:nvPr/>
+        </p:nvCxnSpPr>
+        <p:spPr>
+          <a:xfrm>
+            <a:off x="2090885" y="2170732"/>
+            <a:ext cx="986551" cy="0"/>
+          </a:xfrm>
+          <a:prstGeom prst="line">
+            <a:avLst/>
+          </a:prstGeom>
+        </p:spPr>
+        <p:style>
+          <a:lnRef idx="2">
+            <a:schemeClr val="dk1"/>
+          </a:lnRef>
+          <a:fillRef idx="0">
+            <a:schemeClr val="dk1"/>
+          </a:fillRef>
+          <a:effectRef idx="1">
+            <a:schemeClr val="dk1"/>
+          </a:effectRef>
+          <a:fontRef idx="minor">
+            <a:schemeClr val="tx1"/>
+          </a:fontRef>
+        </p:style>
+      </p:cxnSp>
+      <p:cxnSp>
+        <p:nvCxnSpPr>
+          <p:cNvPr id="41" name="直線コネクタ 40">
+            <a:extLst>
+              <a:ext uri="{FF2B5EF4-FFF2-40B4-BE49-F238E27FC236}">
+                <a16:creationId xmlns:a16="http://schemas.microsoft.com/office/drawing/2014/main" id="{D7A7CBF6-EEF5-9218-3318-FCF01B9AF02A}"/>
+              </a:ext>
+            </a:extLst>
+          </p:cNvPr>
+          <p:cNvCxnSpPr>
+            <a:cxnSpLocks/>
+          </p:cNvCxnSpPr>
+          <p:nvPr/>
+        </p:nvCxnSpPr>
+        <p:spPr>
+          <a:xfrm>
+            <a:off x="752079" y="2875789"/>
+            <a:ext cx="1346400" cy="0"/>
+          </a:xfrm>
+          <a:prstGeom prst="line">
+            <a:avLst/>
+          </a:prstGeom>
+        </p:spPr>
+        <p:style>
+          <a:lnRef idx="2">
+            <a:schemeClr val="dk1"/>
+          </a:lnRef>
+          <a:fillRef idx="0">
+            <a:schemeClr val="dk1"/>
+          </a:fillRef>
+          <a:effectRef idx="1">
+            <a:schemeClr val="dk1"/>
+          </a:effectRef>
+          <a:fontRef idx="minor">
+            <a:schemeClr val="tx1"/>
+          </a:fontRef>
+        </p:style>
+      </p:cxnSp>
+      <p:cxnSp>
+        <p:nvCxnSpPr>
+          <p:cNvPr id="42" name="直線コネクタ 41">
+            <a:extLst>
+              <a:ext uri="{FF2B5EF4-FFF2-40B4-BE49-F238E27FC236}">
+                <a16:creationId xmlns:a16="http://schemas.microsoft.com/office/drawing/2014/main" id="{053A1A42-8019-0434-9ABB-895A82CFAF36}"/>
+              </a:ext>
+            </a:extLst>
+          </p:cNvPr>
+          <p:cNvCxnSpPr>
+            <a:cxnSpLocks/>
+          </p:cNvCxnSpPr>
+          <p:nvPr/>
+        </p:nvCxnSpPr>
+        <p:spPr>
+          <a:xfrm>
+            <a:off x="2090885" y="2170732"/>
+            <a:ext cx="0" cy="705600"/>
+          </a:xfrm>
+          <a:prstGeom prst="line">
+            <a:avLst/>
+          </a:prstGeom>
+        </p:spPr>
+        <p:style>
+          <a:lnRef idx="2">
+            <a:schemeClr val="dk1"/>
+          </a:lnRef>
+          <a:fillRef idx="0">
+            <a:schemeClr val="dk1"/>
+          </a:fillRef>
+          <a:effectRef idx="1">
+            <a:schemeClr val="dk1"/>
+          </a:effectRef>
+          <a:fontRef idx="minor">
+            <a:schemeClr val="tx1"/>
+          </a:fontRef>
+        </p:style>
+      </p:cxnSp>
+      <p:sp>
+        <p:nvSpPr>
+          <p:cNvPr id="54" name="部分円 53">
+            <a:extLst>
+              <a:ext uri="{FF2B5EF4-FFF2-40B4-BE49-F238E27FC236}">
+                <a16:creationId xmlns:a16="http://schemas.microsoft.com/office/drawing/2014/main" id="{1DD5BB77-91FF-D858-973D-971C5929DBDB}"/>
+              </a:ext>
+            </a:extLst>
+          </p:cNvPr>
+          <p:cNvSpPr/>
+          <p:nvPr/>
+        </p:nvSpPr>
+        <p:spPr>
+          <a:xfrm>
+            <a:off x="1243667" y="1390325"/>
+            <a:ext cx="1336218" cy="1458697"/>
+          </a:xfrm>
+          <a:custGeom>
+            <a:avLst/>
+            <a:gdLst>
+              <a:gd name="connsiteX0" fmla="*/ 25 w 1348108"/>
+              <a:gd name="connsiteY0" fmla="*/ 1284920 h 2592124"/>
+              <a:gd name="connsiteX1" fmla="*/ 227299 w 1348108"/>
+              <a:gd name="connsiteY1" fmla="*/ 325562 h 2592124"/>
+              <a:gd name="connsiteX2" fmla="*/ 1244803 w 1348108"/>
+              <a:gd name="connsiteY2" fmla="*/ 606547 h 2592124"/>
+              <a:gd name="connsiteX3" fmla="*/ 674054 w 1348108"/>
+              <a:gd name="connsiteY3" fmla="*/ 1296062 h 2592124"/>
+              <a:gd name="connsiteX4" fmla="*/ 25 w 1348108"/>
+              <a:gd name="connsiteY4" fmla="*/ 1284920 h 2592124"/>
+              <a:gd name="connsiteX0" fmla="*/ 0 w 1244778"/>
+              <a:gd name="connsiteY0" fmla="*/ 1285038 h 1285038"/>
+              <a:gd name="connsiteX1" fmla="*/ 227274 w 1244778"/>
+              <a:gd name="connsiteY1" fmla="*/ 325680 h 1285038"/>
+              <a:gd name="connsiteX2" fmla="*/ 1244778 w 1244778"/>
+              <a:gd name="connsiteY2" fmla="*/ 606665 h 1285038"/>
+              <a:gd name="connsiteX3" fmla="*/ 0 w 1244778"/>
+              <a:gd name="connsiteY3" fmla="*/ 1285038 h 1285038"/>
+              <a:gd name="connsiteX0" fmla="*/ 0 w 1336218"/>
+              <a:gd name="connsiteY0" fmla="*/ 1278795 h 1278795"/>
+              <a:gd name="connsiteX1" fmla="*/ 227274 w 1336218"/>
+              <a:gd name="connsiteY1" fmla="*/ 319437 h 1278795"/>
+              <a:gd name="connsiteX2" fmla="*/ 1336218 w 1336218"/>
+              <a:gd name="connsiteY2" fmla="*/ 691862 h 1278795"/>
+            </a:gdLst>
+            <a:ahLst/>
+            <a:cxnLst>
+              <a:cxn ang="0">
+                <a:pos x="connsiteX0" y="connsiteY0"/>
+              </a:cxn>
+              <a:cxn ang="0">
+                <a:pos x="connsiteX1" y="connsiteY1"/>
+              </a:cxn>
+              <a:cxn ang="0">
+                <a:pos x="connsiteX2" y="connsiteY2"/>
+              </a:cxn>
+            </a:cxnLst>
+            <a:rect l="l" t="t" r="r" b="b"/>
+            <a:pathLst>
+              <a:path w="1336218" h="1278795">
+                <a:moveTo>
+                  <a:pt x="0" y="1278795"/>
+                </a:moveTo>
+                <a:cubicBezTo>
+                  <a:pt x="1642" y="911536"/>
+                  <a:pt x="84244" y="562861"/>
+                  <a:pt x="227274" y="319437"/>
+                </a:cubicBezTo>
+                <a:cubicBezTo>
+                  <a:pt x="538847" y="-210833"/>
+                  <a:pt x="1023413" y="-77019"/>
+                  <a:pt x="1336218" y="691862"/>
+                </a:cubicBezTo>
+              </a:path>
+            </a:pathLst>
+          </a:custGeom>
+          <a:ln w="19050">
+            <a:prstDash val="dash"/>
+          </a:ln>
+        </p:spPr>
+        <p:style>
+          <a:lnRef idx="1">
+            <a:schemeClr val="dk1"/>
+          </a:lnRef>
+          <a:fillRef idx="0">
+            <a:schemeClr val="dk1"/>
+          </a:fillRef>
+          <a:effectRef idx="0">
+            <a:schemeClr val="dk1"/>
+          </a:effectRef>
+          <a:fontRef idx="minor">
+            <a:schemeClr val="tx1"/>
+          </a:fontRef>
+        </p:style>
+        <p:txBody>
+          <a:bodyPr rtlCol="0" anchor="ctr"/>
+          <a:lstStyle/>
+          <a:p>
+            <a:pPr algn="ctr"/>
+            <a:endParaRPr kumimoji="1" lang="ja-JP" altLang="en-US">
+              <a:solidFill>
+                <a:schemeClr val="tx1"/>
+              </a:solidFill>
+            </a:endParaRPr>
+          </a:p>
+        </p:txBody>
+      </p:sp>
+      <p:sp>
+        <p:nvSpPr>
+          <p:cNvPr id="56" name="テキスト ボックス 55">
+            <a:extLst>
+              <a:ext uri="{FF2B5EF4-FFF2-40B4-BE49-F238E27FC236}">
+                <a16:creationId xmlns:a16="http://schemas.microsoft.com/office/drawing/2014/main" id="{423446F0-4AD9-1263-FAEA-C2FA44DCED7C}"/>
+              </a:ext>
+            </a:extLst>
+          </p:cNvPr>
+          <p:cNvSpPr txBox="1"/>
+          <p:nvPr/>
+        </p:nvSpPr>
+        <p:spPr>
+          <a:xfrm>
+            <a:off x="2730586" y="1333867"/>
+            <a:ext cx="2332474" cy="369332"/>
+          </a:xfrm>
+          <a:prstGeom prst="rect">
+            <a:avLst/>
+          </a:prstGeom>
+          <a:noFill/>
+        </p:spPr>
+        <p:txBody>
+          <a:bodyPr wrap="square" rtlCol="0">
+            <a:spAutoFit/>
+          </a:bodyPr>
+          <a:lstStyle/>
+          <a:p>
+            <a:r>
+              <a:rPr lang="ja-JP" altLang="en-US" b="1" dirty="0">
+                <a:ea typeface="Meiryo UI" panose="020B0604030504040204" pitchFamily="50" charset="-128"/>
+              </a:rPr>
+              <a:t>動いてほしい遊脚軌道</a:t>
+            </a:r>
+            <a:endParaRPr kumimoji="1" lang="ja-JP" altLang="en-US" b="1" dirty="0">
+              <a:ea typeface="Meiryo UI" panose="020B0604030504040204" pitchFamily="50" charset="-128"/>
+            </a:endParaRPr>
+          </a:p>
+        </p:txBody>
+      </p:sp>
+      <p:cxnSp>
+        <p:nvCxnSpPr>
+          <p:cNvPr id="57" name="直線コネクタ 56">
+            <a:extLst>
+              <a:ext uri="{FF2B5EF4-FFF2-40B4-BE49-F238E27FC236}">
+                <a16:creationId xmlns:a16="http://schemas.microsoft.com/office/drawing/2014/main" id="{DFFA2065-32F4-3DE7-0BBC-32E0CF688828}"/>
+              </a:ext>
+            </a:extLst>
+          </p:cNvPr>
+          <p:cNvCxnSpPr>
+            <a:cxnSpLocks/>
+            <a:stCxn id="56" idx="1"/>
+          </p:cNvCxnSpPr>
+          <p:nvPr/>
+        </p:nvCxnSpPr>
+        <p:spPr>
+          <a:xfrm flipH="1">
+            <a:off x="2344685" y="1518533"/>
+            <a:ext cx="385901" cy="179248"/>
+          </a:xfrm>
+          <a:prstGeom prst="line">
+            <a:avLst/>
+          </a:prstGeom>
+        </p:spPr>
+        <p:style>
+          <a:lnRef idx="2">
+            <a:schemeClr val="dk1"/>
+          </a:lnRef>
+          <a:fillRef idx="0">
+            <a:schemeClr val="dk1"/>
+          </a:fillRef>
+          <a:effectRef idx="1">
+            <a:schemeClr val="dk1"/>
+          </a:effectRef>
+          <a:fontRef idx="minor">
+            <a:schemeClr val="tx1"/>
+          </a:fontRef>
+        </p:style>
+      </p:cxnSp>
+    </p:spTree>
+    <p:extLst>
+      <p:ext uri="{BB962C8B-B14F-4D97-AF65-F5344CB8AC3E}">
+        <p14:creationId xmlns:p14="http://schemas.microsoft.com/office/powerpoint/2010/main" val="1140161819"/>
+      </p:ext>
+    </p:extLst>
+  </p:cSld>
+  <p:clrMapOvr>
+    <a:masterClrMapping/>
+  </p:clrMapOvr>
+</p:sld>
+</file>
+
 <file path=ppt/theme/theme1.xml><?xml version="1.0" encoding="utf-8"?>
 <a:theme xmlns:a="http://schemas.openxmlformats.org/drawingml/2006/main" name="Office テーマ">
   <a:themeElements>

</xml_diff>